<commit_message>
Update Think Like a Certification Exam.pptx
</commit_message>
<xml_diff>
--- a/SQLSat Bham 2019/Think Like a Certification Exam.pptx
+++ b/SQLSat Bham 2019/Think Like a Certification Exam.pptx
@@ -12,7 +12,7 @@
   </p:notesMasterIdLst>
   <p:sldIdLst>
     <p:sldId id="259" r:id="rId5"/>
-    <p:sldId id="300" r:id="rId6"/>
+    <p:sldId id="416" r:id="rId6"/>
     <p:sldId id="286" r:id="rId7"/>
     <p:sldId id="296" r:id="rId8"/>
     <p:sldId id="287" r:id="rId9"/>
@@ -248,7 +248,7 @@
           <a:p>
             <a:fld id="{6CD4ABDE-846B-4F2E-A91E-CE2D55B6EF91}" type="datetimeFigureOut">
               <a:rPr lang="en-US" smtClean="0"/>
-              <a:t>7/24/2019</a:t>
+              <a:t>7/30/2019</a:t>
             </a:fld>
             <a:endParaRPr lang="en-US"/>
           </a:p>
@@ -823,7 +823,7 @@
           <a:p>
             <a:fld id="{DF1B7059-9994-452B-97D3-B9424BDCF679}" type="datetimeFigureOut">
               <a:rPr lang="en-US" smtClean="0"/>
-              <a:t>7/24/2019</a:t>
+              <a:t>7/30/2019</a:t>
             </a:fld>
             <a:endParaRPr lang="en-US" dirty="0"/>
           </a:p>
@@ -993,7 +993,7 @@
           <a:p>
             <a:fld id="{DF1B7059-9994-452B-97D3-B9424BDCF679}" type="datetimeFigureOut">
               <a:rPr lang="en-US" smtClean="0"/>
-              <a:t>7/24/2019</a:t>
+              <a:t>7/30/2019</a:t>
             </a:fld>
             <a:endParaRPr lang="en-US" dirty="0"/>
           </a:p>
@@ -1173,7 +1173,7 @@
           <a:p>
             <a:fld id="{DF1B7059-9994-452B-97D3-B9424BDCF679}" type="datetimeFigureOut">
               <a:rPr lang="en-US" smtClean="0"/>
-              <a:t>7/24/2019</a:t>
+              <a:t>7/30/2019</a:t>
             </a:fld>
             <a:endParaRPr lang="en-US" dirty="0"/>
           </a:p>
@@ -2564,7 +2564,7 @@
           <a:p>
             <a:fld id="{DF1B7059-9994-452B-97D3-B9424BDCF679}" type="datetimeFigureOut">
               <a:rPr lang="en-US" smtClean="0"/>
-              <a:t>7/24/2019</a:t>
+              <a:t>7/30/2019</a:t>
             </a:fld>
             <a:endParaRPr lang="en-US" dirty="0"/>
           </a:p>
@@ -3209,7 +3209,7 @@
                 </a:solidFill>
               </a:rPr>
               <a:pPr/>
-              <a:t>7/24/2019</a:t>
+              <a:t>7/30/2019</a:t>
             </a:fld>
             <a:endParaRPr lang="en-US" dirty="0">
               <a:solidFill>
@@ -3456,7 +3456,7 @@
           <a:p>
             <a:fld id="{DF1B7059-9994-452B-97D3-B9424BDCF679}" type="datetimeFigureOut">
               <a:rPr lang="en-US" smtClean="0"/>
-              <a:t>7/24/2019</a:t>
+              <a:t>7/30/2019</a:t>
             </a:fld>
             <a:endParaRPr lang="en-US" dirty="0"/>
           </a:p>
@@ -3591,7 +3591,7 @@
                 </a:solidFill>
               </a:rPr>
               <a:pPr/>
-              <a:t>7/24/2019</a:t>
+              <a:t>7/30/2019</a:t>
             </a:fld>
             <a:endParaRPr lang="en-US" dirty="0">
               <a:solidFill>
@@ -3838,7 +3838,7 @@
           <a:p>
             <a:fld id="{DF1B7059-9994-452B-97D3-B9424BDCF679}" type="datetimeFigureOut">
               <a:rPr lang="en-US" smtClean="0"/>
-              <a:t>7/24/2019</a:t>
+              <a:t>7/30/2019</a:t>
             </a:fld>
             <a:endParaRPr lang="en-US" dirty="0"/>
           </a:p>
@@ -4082,7 +4082,7 @@
           <a:p>
             <a:fld id="{DF1B7059-9994-452B-97D3-B9424BDCF679}" type="datetimeFigureOut">
               <a:rPr lang="en-US" smtClean="0"/>
-              <a:t>7/24/2019</a:t>
+              <a:t>7/30/2019</a:t>
             </a:fld>
             <a:endParaRPr lang="en-US" dirty="0"/>
           </a:p>
@@ -4272,7 +4272,7 @@
           <a:p>
             <a:fld id="{3FAA6659-066F-4E7F-BD92-0981E5430CBE}" type="datetimeFigureOut">
               <a:rPr lang="en-US" smtClean="0"/>
-              <a:t>7/24/2019</a:t>
+              <a:t>7/30/2019</a:t>
             </a:fld>
             <a:endParaRPr lang="en-US"/>
           </a:p>
@@ -4440,7 +4440,7 @@
           <a:p>
             <a:fld id="{3FAA6659-066F-4E7F-BD92-0981E5430CBE}" type="datetimeFigureOut">
               <a:rPr lang="en-US" smtClean="0"/>
-              <a:t>7/24/2019</a:t>
+              <a:t>7/30/2019</a:t>
             </a:fld>
             <a:endParaRPr lang="en-US"/>
           </a:p>
@@ -4685,7 +4685,7 @@
           <a:p>
             <a:fld id="{3FAA6659-066F-4E7F-BD92-0981E5430CBE}" type="datetimeFigureOut">
               <a:rPr lang="en-US" smtClean="0"/>
-              <a:t>7/24/2019</a:t>
+              <a:t>7/30/2019</a:t>
             </a:fld>
             <a:endParaRPr lang="en-US"/>
           </a:p>
@@ -4914,7 +4914,7 @@
           <a:p>
             <a:fld id="{3FAA6659-066F-4E7F-BD92-0981E5430CBE}" type="datetimeFigureOut">
               <a:rPr lang="en-US" smtClean="0"/>
-              <a:t>7/24/2019</a:t>
+              <a:t>7/30/2019</a:t>
             </a:fld>
             <a:endParaRPr lang="en-US"/>
           </a:p>
@@ -5278,7 +5278,7 @@
           <a:p>
             <a:fld id="{3FAA6659-066F-4E7F-BD92-0981E5430CBE}" type="datetimeFigureOut">
               <a:rPr lang="en-US" smtClean="0"/>
-              <a:t>7/24/2019</a:t>
+              <a:t>7/30/2019</a:t>
             </a:fld>
             <a:endParaRPr lang="en-US"/>
           </a:p>
@@ -5395,7 +5395,7 @@
           <a:p>
             <a:fld id="{3FAA6659-066F-4E7F-BD92-0981E5430CBE}" type="datetimeFigureOut">
               <a:rPr lang="en-US" smtClean="0"/>
-              <a:t>7/24/2019</a:t>
+              <a:t>7/30/2019</a:t>
             </a:fld>
             <a:endParaRPr lang="en-US"/>
           </a:p>
@@ -5490,7 +5490,7 @@
           <a:p>
             <a:fld id="{3FAA6659-066F-4E7F-BD92-0981E5430CBE}" type="datetimeFigureOut">
               <a:rPr lang="en-US" smtClean="0"/>
-              <a:t>7/24/2019</a:t>
+              <a:t>7/30/2019</a:t>
             </a:fld>
             <a:endParaRPr lang="en-US"/>
           </a:p>
@@ -5765,7 +5765,7 @@
           <a:p>
             <a:fld id="{3FAA6659-066F-4E7F-BD92-0981E5430CBE}" type="datetimeFigureOut">
               <a:rPr lang="en-US" smtClean="0"/>
-              <a:t>7/24/2019</a:t>
+              <a:t>7/30/2019</a:t>
             </a:fld>
             <a:endParaRPr lang="en-US"/>
           </a:p>
@@ -6017,7 +6017,7 @@
           <a:p>
             <a:fld id="{3FAA6659-066F-4E7F-BD92-0981E5430CBE}" type="datetimeFigureOut">
               <a:rPr lang="en-US" smtClean="0"/>
-              <a:t>7/24/2019</a:t>
+              <a:t>7/30/2019</a:t>
             </a:fld>
             <a:endParaRPr lang="en-US"/>
           </a:p>
@@ -6185,7 +6185,7 @@
           <a:p>
             <a:fld id="{3FAA6659-066F-4E7F-BD92-0981E5430CBE}" type="datetimeFigureOut">
               <a:rPr lang="en-US" smtClean="0"/>
-              <a:t>7/24/2019</a:t>
+              <a:t>7/30/2019</a:t>
             </a:fld>
             <a:endParaRPr lang="en-US"/>
           </a:p>
@@ -6417,7 +6417,7 @@
           <a:p>
             <a:fld id="{DF1B7059-9994-452B-97D3-B9424BDCF679}" type="datetimeFigureOut">
               <a:rPr lang="en-US" smtClean="0"/>
-              <a:t>7/24/2019</a:t>
+              <a:t>7/30/2019</a:t>
             </a:fld>
             <a:endParaRPr lang="en-US" dirty="0"/>
           </a:p>
@@ -6595,7 +6595,7 @@
           <a:p>
             <a:fld id="{3FAA6659-066F-4E7F-BD92-0981E5430CBE}" type="datetimeFigureOut">
               <a:rPr lang="en-US" smtClean="0"/>
-              <a:t>7/24/2019</a:t>
+              <a:t>7/30/2019</a:t>
             </a:fld>
             <a:endParaRPr lang="en-US"/>
           </a:p>
@@ -7169,7 +7169,7 @@
           <a:p>
             <a:fld id="{DF1B7059-9994-452B-97D3-B9424BDCF679}" type="datetimeFigureOut">
               <a:rPr lang="en-US" smtClean="0"/>
-              <a:t>7/24/2019</a:t>
+              <a:t>7/30/2019</a:t>
             </a:fld>
             <a:endParaRPr lang="en-US" dirty="0"/>
           </a:p>
@@ -7287,7 +7287,7 @@
           <a:p>
             <a:fld id="{DF1B7059-9994-452B-97D3-B9424BDCF679}" type="datetimeFigureOut">
               <a:rPr lang="en-US" smtClean="0"/>
-              <a:t>7/24/2019</a:t>
+              <a:t>7/30/2019</a:t>
             </a:fld>
             <a:endParaRPr lang="en-US" dirty="0"/>
           </a:p>
@@ -7382,7 +7382,7 @@
           <a:p>
             <a:fld id="{DF1B7059-9994-452B-97D3-B9424BDCF679}" type="datetimeFigureOut">
               <a:rPr lang="en-US" smtClean="0"/>
-              <a:t>7/24/2019</a:t>
+              <a:t>7/30/2019</a:t>
             </a:fld>
             <a:endParaRPr lang="en-US" dirty="0"/>
           </a:p>
@@ -7659,7 +7659,7 @@
           <a:p>
             <a:fld id="{DF1B7059-9994-452B-97D3-B9424BDCF679}" type="datetimeFigureOut">
               <a:rPr lang="en-US" smtClean="0"/>
-              <a:t>7/24/2019</a:t>
+              <a:t>7/30/2019</a:t>
             </a:fld>
             <a:endParaRPr lang="en-US" dirty="0"/>
           </a:p>
@@ -7915,7 +7915,7 @@
           <a:p>
             <a:fld id="{DF1B7059-9994-452B-97D3-B9424BDCF679}" type="datetimeFigureOut">
               <a:rPr lang="en-US" smtClean="0"/>
-              <a:t>7/24/2019</a:t>
+              <a:t>7/30/2019</a:t>
             </a:fld>
             <a:endParaRPr lang="en-US" dirty="0"/>
           </a:p>
@@ -8128,7 +8128,7 @@
           <a:p>
             <a:fld id="{DF1B7059-9994-452B-97D3-B9424BDCF679}" type="datetimeFigureOut">
               <a:rPr lang="en-US" smtClean="0"/>
-              <a:t>7/24/2019</a:t>
+              <a:t>7/30/2019</a:t>
             </a:fld>
             <a:endParaRPr lang="en-US" dirty="0"/>
           </a:p>
@@ -8723,7 +8723,7 @@
                 </a:solidFill>
               </a:rPr>
               <a:pPr/>
-              <a:t>7/24/2019</a:t>
+              <a:t>7/30/2019</a:t>
             </a:fld>
             <a:endParaRPr lang="en-US" dirty="0">
               <a:solidFill>
@@ -9286,7 +9286,7 @@
                 </a:solidFill>
               </a:rPr>
               <a:pPr/>
-              <a:t>7/24/2019</a:t>
+              <a:t>7/30/2019</a:t>
             </a:fld>
             <a:endParaRPr lang="en-US" dirty="0">
               <a:solidFill>
@@ -9804,7 +9804,7 @@
           <a:p>
             <a:fld id="{3FAA6659-066F-4E7F-BD92-0981E5430CBE}" type="datetimeFigureOut">
               <a:rPr lang="en-US" smtClean="0"/>
-              <a:t>7/24/2019</a:t>
+              <a:t>7/30/2019</a:t>
             </a:fld>
             <a:endParaRPr lang="en-US"/>
           </a:p>
@@ -11000,7 +11000,7 @@
           <a:p>
             <a:r>
               <a:rPr lang="en-US" dirty="0"/>
-              <a:t>Test-taking Insight</a:t>
+              <a:t>How To Prepare for Cert Exams</a:t>
             </a:r>
           </a:p>
         </p:txBody>
@@ -11333,7 +11333,7 @@
           <a:p>
             <a:r>
               <a:rPr lang="en-US" dirty="0"/>
-              <a:t>Test-taking Insight</a:t>
+              <a:t>How To Prepare for Cert Exams</a:t>
             </a:r>
           </a:p>
         </p:txBody>
@@ -11362,7 +11362,7 @@
           <a:p>
             <a:r>
               <a:rPr lang="en-US" sz="4400" dirty="0"/>
-              <a:t>Do not study by reading (alone).</a:t>
+              <a:t>Do not study only by reading books/MSDN.</a:t>
             </a:r>
           </a:p>
           <a:p>
@@ -13980,7 +13980,7 @@
                 </a:solidFill>
                 <a:latin typeface="+mn-lt"/>
               </a:rPr>
-              <a:t>. – that’s it on the menu</a:t>
+              <a:t>. – that’s it for the menu</a:t>
             </a:r>
           </a:p>
           <a:p>
@@ -14116,7 +14116,65 @@
                 </a:solidFill>
                 <a:latin typeface="+mn-lt"/>
               </a:rPr>
-              <a:t>The "application only connects to </a:t>
+              <a:t>The "application </a:t>
+            </a:r>
+            <a:r>
+              <a:rPr lang="en-US" sz="3200" dirty="0">
+                <a:solidFill>
+                  <a:schemeClr val="tx1"/>
+                </a:solidFill>
+                <a:latin typeface="+mn-lt"/>
+              </a:rPr>
+              <a:t>only connects </a:t>
+            </a:r>
+            <a:r>
+              <a:rPr lang="en-US" sz="3200" b="0" dirty="0">
+                <a:solidFill>
+                  <a:schemeClr val="tx1"/>
+                </a:solidFill>
+                <a:latin typeface="+mn-lt"/>
+              </a:rPr>
+              <a:t>to one database" </a:t>
+            </a:r>
+          </a:p>
+          <a:p>
+            <a:r>
+              <a:rPr lang="en-US" sz="3200" b="0" dirty="0">
+                <a:solidFill>
+                  <a:schemeClr val="tx1"/>
+                </a:solidFill>
+                <a:latin typeface="+mn-lt"/>
+              </a:rPr>
+              <a:t>vs. </a:t>
+            </a:r>
+          </a:p>
+          <a:p>
+            <a:r>
+              <a:rPr lang="en-US" sz="3200" b="0" dirty="0">
+                <a:solidFill>
+                  <a:schemeClr val="tx1"/>
+                </a:solidFill>
+                <a:latin typeface="+mn-lt"/>
+              </a:rPr>
+              <a:t>the "application connects to </a:t>
+            </a:r>
+            <a:r>
+              <a:rPr lang="en-US" sz="3200" dirty="0">
+                <a:solidFill>
+                  <a:schemeClr val="tx1"/>
+                </a:solidFill>
+                <a:latin typeface="+mn-lt"/>
+              </a:rPr>
+              <a:t>only</a:t>
+            </a:r>
+            <a:r>
+              <a:rPr lang="en-US" sz="3200" b="0" dirty="0">
+                <a:solidFill>
+                  <a:schemeClr val="tx1"/>
+                </a:solidFill>
+                <a:latin typeface="+mn-lt"/>
+              </a:rPr>
+              <a:t> </a:t>
             </a:r>
             <a:r>
               <a:rPr lang="en-US" sz="3200" dirty="0">
@@ -14134,47 +14192,7 @@
                 </a:solidFill>
                 <a:latin typeface="+mn-lt"/>
               </a:rPr>
-              <a:t> database" </a:t>
-            </a:r>
-          </a:p>
-          <a:p>
-            <a:r>
-              <a:rPr lang="en-US" sz="3200" b="0" dirty="0">
-                <a:solidFill>
-                  <a:schemeClr val="tx1"/>
-                </a:solidFill>
-                <a:latin typeface="+mn-lt"/>
-              </a:rPr>
-              <a:t>vs. </a:t>
-            </a:r>
-          </a:p>
-          <a:p>
-            <a:r>
-              <a:rPr lang="en-US" sz="3200" b="0" dirty="0">
-                <a:solidFill>
-                  <a:schemeClr val="tx1"/>
-                </a:solidFill>
-                <a:latin typeface="+mn-lt"/>
-              </a:rPr>
-              <a:t>the "application connects to </a:t>
-            </a:r>
-            <a:r>
-              <a:rPr lang="en-US" sz="3200" dirty="0">
-                <a:solidFill>
-                  <a:schemeClr val="tx1"/>
-                </a:solidFill>
-                <a:latin typeface="+mn-lt"/>
-              </a:rPr>
-              <a:t>only</a:t>
-            </a:r>
-            <a:r>
-              <a:rPr lang="en-US" sz="3200" b="0" dirty="0">
-                <a:solidFill>
-                  <a:schemeClr val="tx1"/>
-                </a:solidFill>
-                <a:latin typeface="+mn-lt"/>
-              </a:rPr>
-              <a:t> one database"</a:t>
+              <a:t> database"</a:t>
             </a:r>
           </a:p>
         </p:txBody>
@@ -14614,19 +14632,19 @@
           <a:p>
             <a:r>
               <a:rPr lang="en-US" sz="3200" dirty="0"/>
-              <a:t>You are choosing the leader for your starship out of the ranks of captains throughout time.</a:t>
+              <a:t>You are choosing the leader for your new flagship out of the ranks of captains throughout time.</a:t>
             </a:r>
           </a:p>
           <a:p>
             <a:r>
               <a:rPr lang="en-US" sz="3200" dirty="0"/>
-              <a:t>Your choice must have experience in both Star Trek franchise movies and TV shows. The captain must have a superior hairstyle.</a:t>
+              <a:t>Your choice must at least five seasons of TV experience. The new captain must have a superior hairstyle.</a:t>
             </a:r>
           </a:p>
           <a:p>
             <a:r>
               <a:rPr lang="en-US" sz="3200" dirty="0"/>
-              <a:t>Who do you choose?</a:t>
+              <a:t>You need to choose a leader for your starship.</a:t>
             </a:r>
             <a:endParaRPr lang="en-US" dirty="0"/>
           </a:p>
@@ -14683,7 +14701,7 @@
         </p:nvSpPr>
         <p:spPr>
           <a:xfrm rot="10800000">
-            <a:off x="3848878" y="4157021"/>
+            <a:off x="3721058" y="4160492"/>
             <a:ext cx="1371600" cy="385483"/>
           </a:xfrm>
           <a:prstGeom prst="rightArrow">
@@ -14718,7 +14736,7 @@
     </p:spTree>
     <p:extLst>
       <p:ext uri="{BB962C8B-B14F-4D97-AF65-F5344CB8AC3E}">
-        <p14:creationId xmlns:p14="http://schemas.microsoft.com/office/powerpoint/2010/main" val="3998209774"/>
+        <p14:creationId xmlns:p14="http://schemas.microsoft.com/office/powerpoint/2010/main" val="1395901747"/>
       </p:ext>
     </p:extLst>
   </p:cSld>
@@ -16592,7 +16610,7 @@
                 </a:solidFill>
                 <a:latin typeface="+mn-lt"/>
               </a:rPr>
-              <a:t>difficult to keep the answer simple</a:t>
+              <a:t>difficult to keep the question scenario simple</a:t>
             </a:r>
             <a:r>
               <a:rPr lang="en-US" sz="3600" b="0" dirty="0">
@@ -16855,7 +16873,7 @@
         <p:spPr>
           <a:xfrm>
             <a:off x="233916" y="1073886"/>
-            <a:ext cx="11292799" cy="3785652"/>
+            <a:ext cx="11292799" cy="4154984"/>
           </a:xfrm>
           <a:prstGeom prst="rect">
             <a:avLst/>
@@ -16869,23 +16887,23 @@
           <a:lstStyle/>
           <a:p>
             <a:r>
-              <a:rPr lang="en-US" sz="4000" dirty="0"/>
+              <a:rPr lang="en-US" sz="4400" dirty="0"/>
               <a:t>“Domain Drift” is when your question became so complicated,</a:t>
             </a:r>
           </a:p>
           <a:p>
             <a:r>
-              <a:rPr lang="en-US" sz="4000" dirty="0"/>
+              <a:rPr lang="en-US" sz="4400" dirty="0"/>
               <a:t>you end up with a question on a different topic. </a:t>
             </a:r>
           </a:p>
           <a:p>
-            <a:endParaRPr lang="en-US" sz="4000" dirty="0"/>
-          </a:p>
-          <a:p>
-            <a:r>
-              <a:rPr lang="en-US" sz="4000" dirty="0"/>
-              <a:t>Now you have to beg another item writer to trade question assignments with you.</a:t>
+            <a:endParaRPr lang="en-US" sz="4400" dirty="0"/>
+          </a:p>
+          <a:p>
+            <a:r>
+              <a:rPr lang="en-US" sz="4400" dirty="0"/>
+              <a:t>Now you have to beg another Item Writer to trade question assignments with you.</a:t>
             </a:r>
           </a:p>
         </p:txBody>
@@ -22546,7 +22564,25 @@
                 </a:solidFill>
                 <a:latin typeface="+mn-lt"/>
               </a:rPr>
-              <a:t>It’s a question about the details of solution selection.</a:t>
+              <a:t>It’s a question about the details of </a:t>
+            </a:r>
+            <a:r>
+              <a:rPr lang="en-US" sz="3200" dirty="0">
+                <a:solidFill>
+                  <a:srgbClr val="C00000"/>
+                </a:solidFill>
+                <a:latin typeface="+mn-lt"/>
+              </a:rPr>
+              <a:t>solution selection</a:t>
+            </a:r>
+            <a:r>
+              <a:rPr lang="en-US" sz="3200" b="0" dirty="0">
+                <a:solidFill>
+                  <a:srgbClr val="C00000"/>
+                </a:solidFill>
+                <a:latin typeface="+mn-lt"/>
+              </a:rPr>
+              <a:t>.</a:t>
             </a:r>
           </a:p>
         </p:txBody>
@@ -23357,19 +23393,19 @@
           <a:p>
             <a:r>
               <a:rPr lang="en-US" sz="3200" dirty="0"/>
-              <a:t>You are choosing the leader for your starship out of the ranks of captains throughout time.</a:t>
+              <a:t>You are choosing the leader for your new flagship out of the ranks of captains throughout time.</a:t>
             </a:r>
           </a:p>
           <a:p>
             <a:r>
               <a:rPr lang="en-US" sz="3200" dirty="0"/>
-              <a:t>Your choice must have experience in both Star Trek franchise movies and TV shows. The captain must have a superior hairstyle.</a:t>
+              <a:t>Your choice must at least five seasons of TV experience. The new captain must have a superior hairstyle.</a:t>
             </a:r>
           </a:p>
           <a:p>
             <a:r>
               <a:rPr lang="en-US" sz="3200" dirty="0"/>
-              <a:t>Who do you choose?</a:t>
+              <a:t>You need to choose a leader for your starship.</a:t>
             </a:r>
             <a:endParaRPr lang="en-US" dirty="0"/>
           </a:p>
@@ -23492,7 +23528,7 @@
         </p:nvCxnSpPr>
         <p:spPr>
           <a:xfrm flipH="1" flipV="1">
-            <a:off x="1619951" y="3931812"/>
+            <a:off x="1619951" y="3978906"/>
             <a:ext cx="3988778" cy="38478"/>
           </a:xfrm>
           <a:prstGeom prst="line">
@@ -23522,13 +23558,15 @@
       <p:cxnSp>
         <p:nvCxnSpPr>
           <p:cNvPr id="13" name="Straight Connector 12"/>
-          <p:cNvCxnSpPr/>
+          <p:cNvCxnSpPr>
+            <a:cxnSpLocks/>
+          </p:cNvCxnSpPr>
           <p:nvPr/>
         </p:nvCxnSpPr>
         <p:spPr>
           <a:xfrm flipH="1">
-            <a:off x="942369" y="2868558"/>
-            <a:ext cx="2195819" cy="1"/>
+            <a:off x="4119716" y="2839062"/>
+            <a:ext cx="2703872" cy="0"/>
           </a:xfrm>
           <a:prstGeom prst="line">
             <a:avLst/>
@@ -23553,13 +23591,15 @@
       <p:cxnSp>
         <p:nvCxnSpPr>
           <p:cNvPr id="14" name="Straight Connector 13"/>
-          <p:cNvCxnSpPr/>
+          <p:cNvCxnSpPr>
+            <a:cxnSpLocks/>
+          </p:cNvCxnSpPr>
           <p:nvPr/>
         </p:nvCxnSpPr>
         <p:spPr>
           <a:xfrm flipH="1">
-            <a:off x="6804025" y="2873662"/>
-            <a:ext cx="2969731" cy="0"/>
+            <a:off x="7187381" y="2527073"/>
+            <a:ext cx="2153264" cy="0"/>
           </a:xfrm>
           <a:prstGeom prst="line">
             <a:avLst/>
@@ -23588,13 +23628,15 @@
       <p:cxnSp>
         <p:nvCxnSpPr>
           <p:cNvPr id="15" name="Straight Connector 14"/>
-          <p:cNvCxnSpPr/>
+          <p:cNvCxnSpPr>
+            <a:cxnSpLocks/>
+          </p:cNvCxnSpPr>
           <p:nvPr/>
         </p:nvCxnSpPr>
         <p:spPr>
           <a:xfrm flipH="1">
-            <a:off x="942369" y="2107743"/>
-            <a:ext cx="1244097" cy="0"/>
+            <a:off x="942370" y="2107743"/>
+            <a:ext cx="1702507" cy="0"/>
           </a:xfrm>
           <a:prstGeom prst="line">
             <a:avLst/>
@@ -23628,7 +23670,7 @@
         </p:nvSpPr>
         <p:spPr>
           <a:xfrm rot="10800000">
-            <a:off x="3848878" y="4157021"/>
+            <a:off x="3721058" y="4160492"/>
             <a:ext cx="1371600" cy="385483"/>
           </a:xfrm>
           <a:prstGeom prst="rightArrow">
@@ -23670,551 +23712,6 @@
   <p:clrMapOvr>
     <a:masterClrMapping/>
   </p:clrMapOvr>
-  <p:timing>
-    <p:tnLst>
-      <p:par>
-        <p:cTn id="1" dur="indefinite" restart="never" nodeType="tmRoot">
-          <p:childTnLst>
-            <p:seq concurrent="1" nextAc="seek">
-              <p:cTn id="2" dur="indefinite" nodeType="mainSeq">
-                <p:childTnLst>
-                  <p:par>
-                    <p:cTn id="3" fill="hold">
-                      <p:stCondLst>
-                        <p:cond delay="indefinite"/>
-                      </p:stCondLst>
-                      <p:childTnLst>
-                        <p:par>
-                          <p:cTn id="4" fill="hold">
-                            <p:stCondLst>
-                              <p:cond delay="0"/>
-                            </p:stCondLst>
-                            <p:childTnLst>
-                              <p:par>
-                                <p:cTn id="5" presetID="1" presetClass="entr" presetSubtype="0" fill="hold" nodeType="clickEffect">
-                                  <p:stCondLst>
-                                    <p:cond delay="0"/>
-                                  </p:stCondLst>
-                                  <p:childTnLst>
-                                    <p:set>
-                                      <p:cBhvr>
-                                        <p:cTn id="6" dur="1" fill="hold">
-                                          <p:stCondLst>
-                                            <p:cond delay="0"/>
-                                          </p:stCondLst>
-                                        </p:cTn>
-                                        <p:tgtEl>
-                                          <p:spTgt spid="7"/>
-                                        </p:tgtEl>
-                                        <p:attrNameLst>
-                                          <p:attrName>style.visibility</p:attrName>
-                                        </p:attrNameLst>
-                                      </p:cBhvr>
-                                      <p:to>
-                                        <p:strVal val="visible"/>
-                                      </p:to>
-                                    </p:set>
-                                  </p:childTnLst>
-                                </p:cTn>
-                              </p:par>
-                              <p:par>
-                                <p:cTn id="7" presetID="1" presetClass="entr" presetSubtype="0" fill="hold" nodeType="withEffect">
-                                  <p:stCondLst>
-                                    <p:cond delay="0"/>
-                                  </p:stCondLst>
-                                  <p:childTnLst>
-                                    <p:set>
-                                      <p:cBhvr>
-                                        <p:cTn id="8" dur="1" fill="hold">
-                                          <p:stCondLst>
-                                            <p:cond delay="0"/>
-                                          </p:stCondLst>
-                                        </p:cTn>
-                                        <p:tgtEl>
-                                          <p:spTgt spid="15"/>
-                                        </p:tgtEl>
-                                        <p:attrNameLst>
-                                          <p:attrName>style.visibility</p:attrName>
-                                        </p:attrNameLst>
-                                      </p:cBhvr>
-                                      <p:to>
-                                        <p:strVal val="visible"/>
-                                      </p:to>
-                                    </p:set>
-                                  </p:childTnLst>
-                                </p:cTn>
-                              </p:par>
-                            </p:childTnLst>
-                          </p:cTn>
-                        </p:par>
-                      </p:childTnLst>
-                    </p:cTn>
-                  </p:par>
-                  <p:par>
-                    <p:cTn id="9" fill="hold">
-                      <p:stCondLst>
-                        <p:cond delay="indefinite"/>
-                      </p:stCondLst>
-                      <p:childTnLst>
-                        <p:par>
-                          <p:cTn id="10" fill="hold">
-                            <p:stCondLst>
-                              <p:cond delay="0"/>
-                            </p:stCondLst>
-                            <p:childTnLst>
-                              <p:par>
-                                <p:cTn id="11" presetID="1" presetClass="entr" presetSubtype="0" fill="hold" nodeType="clickEffect">
-                                  <p:stCondLst>
-                                    <p:cond delay="0"/>
-                                  </p:stCondLst>
-                                  <p:childTnLst>
-                                    <p:set>
-                                      <p:cBhvr>
-                                        <p:cTn id="12" dur="1" fill="hold">
-                                          <p:stCondLst>
-                                            <p:cond delay="0"/>
-                                          </p:stCondLst>
-                                        </p:cTn>
-                                        <p:tgtEl>
-                                          <p:spTgt spid="5"/>
-                                        </p:tgtEl>
-                                        <p:attrNameLst>
-                                          <p:attrName>style.visibility</p:attrName>
-                                        </p:attrNameLst>
-                                      </p:cBhvr>
-                                      <p:to>
-                                        <p:strVal val="visible"/>
-                                      </p:to>
-                                    </p:set>
-                                  </p:childTnLst>
-                                </p:cTn>
-                              </p:par>
-                              <p:par>
-                                <p:cTn id="13" presetID="1" presetClass="entr" presetSubtype="0" fill="hold" nodeType="withEffect">
-                                  <p:stCondLst>
-                                    <p:cond delay="0"/>
-                                  </p:stCondLst>
-                                  <p:childTnLst>
-                                    <p:set>
-                                      <p:cBhvr>
-                                        <p:cTn id="14" dur="1" fill="hold">
-                                          <p:stCondLst>
-                                            <p:cond delay="0"/>
-                                          </p:stCondLst>
-                                        </p:cTn>
-                                        <p:tgtEl>
-                                          <p:spTgt spid="13"/>
-                                        </p:tgtEl>
-                                        <p:attrNameLst>
-                                          <p:attrName>style.visibility</p:attrName>
-                                        </p:attrNameLst>
-                                      </p:cBhvr>
-                                      <p:to>
-                                        <p:strVal val="visible"/>
-                                      </p:to>
-                                    </p:set>
-                                  </p:childTnLst>
-                                </p:cTn>
-                              </p:par>
-                            </p:childTnLst>
-                          </p:cTn>
-                        </p:par>
-                      </p:childTnLst>
-                    </p:cTn>
-                  </p:par>
-                  <p:par>
-                    <p:cTn id="15" fill="hold">
-                      <p:stCondLst>
-                        <p:cond delay="indefinite"/>
-                      </p:stCondLst>
-                      <p:childTnLst>
-                        <p:par>
-                          <p:cTn id="16" fill="hold">
-                            <p:stCondLst>
-                              <p:cond delay="0"/>
-                            </p:stCondLst>
-                            <p:childTnLst>
-                              <p:par>
-                                <p:cTn id="17" presetID="1" presetClass="entr" presetSubtype="0" fill="hold" nodeType="clickEffect">
-                                  <p:stCondLst>
-                                    <p:cond delay="0"/>
-                                  </p:stCondLst>
-                                  <p:childTnLst>
-                                    <p:set>
-                                      <p:cBhvr>
-                                        <p:cTn id="18" dur="1" fill="hold">
-                                          <p:stCondLst>
-                                            <p:cond delay="0"/>
-                                          </p:stCondLst>
-                                        </p:cTn>
-                                        <p:tgtEl>
-                                          <p:spTgt spid="8"/>
-                                        </p:tgtEl>
-                                        <p:attrNameLst>
-                                          <p:attrName>style.visibility</p:attrName>
-                                        </p:attrNameLst>
-                                      </p:cBhvr>
-                                      <p:to>
-                                        <p:strVal val="visible"/>
-                                      </p:to>
-                                    </p:set>
-                                  </p:childTnLst>
-                                </p:cTn>
-                              </p:par>
-                              <p:par>
-                                <p:cTn id="19" presetID="1" presetClass="entr" presetSubtype="0" fill="hold" nodeType="withEffect">
-                                  <p:stCondLst>
-                                    <p:cond delay="0"/>
-                                  </p:stCondLst>
-                                  <p:childTnLst>
-                                    <p:set>
-                                      <p:cBhvr>
-                                        <p:cTn id="20" dur="1" fill="hold">
-                                          <p:stCondLst>
-                                            <p:cond delay="0"/>
-                                          </p:stCondLst>
-                                        </p:cTn>
-                                        <p:tgtEl>
-                                          <p:spTgt spid="14"/>
-                                        </p:tgtEl>
-                                        <p:attrNameLst>
-                                          <p:attrName>style.visibility</p:attrName>
-                                        </p:attrNameLst>
-                                      </p:cBhvr>
-                                      <p:to>
-                                        <p:strVal val="visible"/>
-                                      </p:to>
-                                    </p:set>
-                                  </p:childTnLst>
-                                </p:cTn>
-                              </p:par>
-                            </p:childTnLst>
-                          </p:cTn>
-                        </p:par>
-                      </p:childTnLst>
-                    </p:cTn>
-                  </p:par>
-                  <p:par>
-                    <p:cTn id="21" fill="hold">
-                      <p:stCondLst>
-                        <p:cond delay="indefinite"/>
-                      </p:stCondLst>
-                      <p:childTnLst>
-                        <p:par>
-                          <p:cTn id="22" fill="hold">
-                            <p:stCondLst>
-                              <p:cond delay="0"/>
-                            </p:stCondLst>
-                            <p:childTnLst>
-                              <p:par>
-                                <p:cTn id="23" presetID="26" presetClass="entr" presetSubtype="0" fill="hold" grpId="0" nodeType="clickEffect">
-                                  <p:stCondLst>
-                                    <p:cond delay="0"/>
-                                  </p:stCondLst>
-                                  <p:childTnLst>
-                                    <p:set>
-                                      <p:cBhvr>
-                                        <p:cTn id="24" dur="1" fill="hold">
-                                          <p:stCondLst>
-                                            <p:cond delay="0"/>
-                                          </p:stCondLst>
-                                        </p:cTn>
-                                        <p:tgtEl>
-                                          <p:spTgt spid="17"/>
-                                        </p:tgtEl>
-                                        <p:attrNameLst>
-                                          <p:attrName>style.visibility</p:attrName>
-                                        </p:attrNameLst>
-                                      </p:cBhvr>
-                                      <p:to>
-                                        <p:strVal val="visible"/>
-                                      </p:to>
-                                    </p:set>
-                                    <p:animEffect transition="in" filter="wipe(down)">
-                                      <p:cBhvr>
-                                        <p:cTn id="25" dur="580">
-                                          <p:stCondLst>
-                                            <p:cond delay="0"/>
-                                          </p:stCondLst>
-                                        </p:cTn>
-                                        <p:tgtEl>
-                                          <p:spTgt spid="17"/>
-                                        </p:tgtEl>
-                                      </p:cBhvr>
-                                    </p:animEffect>
-                                    <p:anim calcmode="lin" valueType="num">
-                                      <p:cBhvr>
-                                        <p:cTn id="26" dur="1822" tmFilter="0,0; 0.14,0.36; 0.43,0.73; 0.71,0.91; 1.0,1.0">
-                                          <p:stCondLst>
-                                            <p:cond delay="0"/>
-                                          </p:stCondLst>
-                                        </p:cTn>
-                                        <p:tgtEl>
-                                          <p:spTgt spid="17"/>
-                                        </p:tgtEl>
-                                        <p:attrNameLst>
-                                          <p:attrName>ppt_x</p:attrName>
-                                        </p:attrNameLst>
-                                      </p:cBhvr>
-                                      <p:tavLst>
-                                        <p:tav tm="0">
-                                          <p:val>
-                                            <p:strVal val="#ppt_x-0.25"/>
-                                          </p:val>
-                                        </p:tav>
-                                        <p:tav tm="100000">
-                                          <p:val>
-                                            <p:strVal val="#ppt_x"/>
-                                          </p:val>
-                                        </p:tav>
-                                      </p:tavLst>
-                                    </p:anim>
-                                    <p:anim calcmode="lin" valueType="num">
-                                      <p:cBhvr>
-                                        <p:cTn id="27" dur="664" tmFilter="0.0,0.0; 0.25,0.07; 0.50,0.2; 0.75,0.467; 1.0,1.0">
-                                          <p:stCondLst>
-                                            <p:cond delay="0"/>
-                                          </p:stCondLst>
-                                        </p:cTn>
-                                        <p:tgtEl>
-                                          <p:spTgt spid="17"/>
-                                        </p:tgtEl>
-                                        <p:attrNameLst>
-                                          <p:attrName>ppt_y</p:attrName>
-                                        </p:attrNameLst>
-                                      </p:cBhvr>
-                                      <p:tavLst>
-                                        <p:tav tm="0" fmla="#ppt_y-sin(pi*$)/3">
-                                          <p:val>
-                                            <p:fltVal val="0.5"/>
-                                          </p:val>
-                                        </p:tav>
-                                        <p:tav tm="100000">
-                                          <p:val>
-                                            <p:fltVal val="1"/>
-                                          </p:val>
-                                        </p:tav>
-                                      </p:tavLst>
-                                    </p:anim>
-                                    <p:anim calcmode="lin" valueType="num">
-                                      <p:cBhvr>
-                                        <p:cTn id="28" dur="664" tmFilter="0, 0; 0.125,0.2665; 0.25,0.4; 0.375,0.465; 0.5,0.5;  0.625,0.535; 0.75,0.6; 0.875,0.7335; 1,1">
-                                          <p:stCondLst>
-                                            <p:cond delay="664"/>
-                                          </p:stCondLst>
-                                        </p:cTn>
-                                        <p:tgtEl>
-                                          <p:spTgt spid="17"/>
-                                        </p:tgtEl>
-                                        <p:attrNameLst>
-                                          <p:attrName>ppt_y</p:attrName>
-                                        </p:attrNameLst>
-                                      </p:cBhvr>
-                                      <p:tavLst>
-                                        <p:tav tm="0" fmla="#ppt_y-sin(pi*$)/9">
-                                          <p:val>
-                                            <p:fltVal val="0"/>
-                                          </p:val>
-                                        </p:tav>
-                                        <p:tav tm="100000">
-                                          <p:val>
-                                            <p:fltVal val="1"/>
-                                          </p:val>
-                                        </p:tav>
-                                      </p:tavLst>
-                                    </p:anim>
-                                    <p:anim calcmode="lin" valueType="num">
-                                      <p:cBhvr>
-                                        <p:cTn id="29" dur="332" tmFilter="0, 0; 0.125,0.2665; 0.25,0.4; 0.375,0.465; 0.5,0.5;  0.625,0.535; 0.75,0.6; 0.875,0.7335; 1,1">
-                                          <p:stCondLst>
-                                            <p:cond delay="1324"/>
-                                          </p:stCondLst>
-                                        </p:cTn>
-                                        <p:tgtEl>
-                                          <p:spTgt spid="17"/>
-                                        </p:tgtEl>
-                                        <p:attrNameLst>
-                                          <p:attrName>ppt_y</p:attrName>
-                                        </p:attrNameLst>
-                                      </p:cBhvr>
-                                      <p:tavLst>
-                                        <p:tav tm="0" fmla="#ppt_y-sin(pi*$)/27">
-                                          <p:val>
-                                            <p:fltVal val="0"/>
-                                          </p:val>
-                                        </p:tav>
-                                        <p:tav tm="100000">
-                                          <p:val>
-                                            <p:fltVal val="1"/>
-                                          </p:val>
-                                        </p:tav>
-                                      </p:tavLst>
-                                    </p:anim>
-                                    <p:anim calcmode="lin" valueType="num">
-                                      <p:cBhvr>
-                                        <p:cTn id="30" dur="164" tmFilter="0, 0; 0.125,0.2665; 0.25,0.4; 0.375,0.465; 0.5,0.5;  0.625,0.535; 0.75,0.6; 0.875,0.7335; 1,1">
-                                          <p:stCondLst>
-                                            <p:cond delay="1656"/>
-                                          </p:stCondLst>
-                                        </p:cTn>
-                                        <p:tgtEl>
-                                          <p:spTgt spid="17"/>
-                                        </p:tgtEl>
-                                        <p:attrNameLst>
-                                          <p:attrName>ppt_y</p:attrName>
-                                        </p:attrNameLst>
-                                      </p:cBhvr>
-                                      <p:tavLst>
-                                        <p:tav tm="0" fmla="#ppt_y-sin(pi*$)/81">
-                                          <p:val>
-                                            <p:fltVal val="0"/>
-                                          </p:val>
-                                        </p:tav>
-                                        <p:tav tm="100000">
-                                          <p:val>
-                                            <p:fltVal val="1"/>
-                                          </p:val>
-                                        </p:tav>
-                                      </p:tavLst>
-                                    </p:anim>
-                                    <p:animScale>
-                                      <p:cBhvr>
-                                        <p:cTn id="31" dur="26">
-                                          <p:stCondLst>
-                                            <p:cond delay="650"/>
-                                          </p:stCondLst>
-                                        </p:cTn>
-                                        <p:tgtEl>
-                                          <p:spTgt spid="17"/>
-                                        </p:tgtEl>
-                                      </p:cBhvr>
-                                      <p:to x="100000" y="60000"/>
-                                    </p:animScale>
-                                    <p:animScale>
-                                      <p:cBhvr>
-                                        <p:cTn id="32" dur="166" decel="50000">
-                                          <p:stCondLst>
-                                            <p:cond delay="676"/>
-                                          </p:stCondLst>
-                                        </p:cTn>
-                                        <p:tgtEl>
-                                          <p:spTgt spid="17"/>
-                                        </p:tgtEl>
-                                      </p:cBhvr>
-                                      <p:to x="100000" y="100000"/>
-                                    </p:animScale>
-                                    <p:animScale>
-                                      <p:cBhvr>
-                                        <p:cTn id="33" dur="26">
-                                          <p:stCondLst>
-                                            <p:cond delay="1312"/>
-                                          </p:stCondLst>
-                                        </p:cTn>
-                                        <p:tgtEl>
-                                          <p:spTgt spid="17"/>
-                                        </p:tgtEl>
-                                      </p:cBhvr>
-                                      <p:to x="100000" y="80000"/>
-                                    </p:animScale>
-                                    <p:animScale>
-                                      <p:cBhvr>
-                                        <p:cTn id="34" dur="166" decel="50000">
-                                          <p:stCondLst>
-                                            <p:cond delay="1338"/>
-                                          </p:stCondLst>
-                                        </p:cTn>
-                                        <p:tgtEl>
-                                          <p:spTgt spid="17"/>
-                                        </p:tgtEl>
-                                      </p:cBhvr>
-                                      <p:to x="100000" y="100000"/>
-                                    </p:animScale>
-                                    <p:animScale>
-                                      <p:cBhvr>
-                                        <p:cTn id="35" dur="26">
-                                          <p:stCondLst>
-                                            <p:cond delay="1642"/>
-                                          </p:stCondLst>
-                                        </p:cTn>
-                                        <p:tgtEl>
-                                          <p:spTgt spid="17"/>
-                                        </p:tgtEl>
-                                      </p:cBhvr>
-                                      <p:to x="100000" y="90000"/>
-                                    </p:animScale>
-                                    <p:animScale>
-                                      <p:cBhvr>
-                                        <p:cTn id="36" dur="166" decel="50000">
-                                          <p:stCondLst>
-                                            <p:cond delay="1668"/>
-                                          </p:stCondLst>
-                                        </p:cTn>
-                                        <p:tgtEl>
-                                          <p:spTgt spid="17"/>
-                                        </p:tgtEl>
-                                      </p:cBhvr>
-                                      <p:to x="100000" y="100000"/>
-                                    </p:animScale>
-                                    <p:animScale>
-                                      <p:cBhvr>
-                                        <p:cTn id="37" dur="26">
-                                          <p:stCondLst>
-                                            <p:cond delay="1808"/>
-                                          </p:stCondLst>
-                                        </p:cTn>
-                                        <p:tgtEl>
-                                          <p:spTgt spid="17"/>
-                                        </p:tgtEl>
-                                      </p:cBhvr>
-                                      <p:to x="100000" y="95000"/>
-                                    </p:animScale>
-                                    <p:animScale>
-                                      <p:cBhvr>
-                                        <p:cTn id="38" dur="166" decel="50000">
-                                          <p:stCondLst>
-                                            <p:cond delay="1834"/>
-                                          </p:stCondLst>
-                                        </p:cTn>
-                                        <p:tgtEl>
-                                          <p:spTgt spid="17"/>
-                                        </p:tgtEl>
-                                      </p:cBhvr>
-                                      <p:to x="100000" y="100000"/>
-                                    </p:animScale>
-                                  </p:childTnLst>
-                                </p:cTn>
-                              </p:par>
-                            </p:childTnLst>
-                          </p:cTn>
-                        </p:par>
-                      </p:childTnLst>
-                    </p:cTn>
-                  </p:par>
-                </p:childTnLst>
-              </p:cTn>
-              <p:prevCondLst>
-                <p:cond evt="onPrev" delay="0">
-                  <p:tgtEl>
-                    <p:sldTgt/>
-                  </p:tgtEl>
-                </p:cond>
-              </p:prevCondLst>
-              <p:nextCondLst>
-                <p:cond evt="onNext" delay="0">
-                  <p:tgtEl>
-                    <p:sldTgt/>
-                  </p:tgtEl>
-                </p:cond>
-              </p:nextCondLst>
-            </p:seq>
-          </p:childTnLst>
-        </p:cTn>
-      </p:par>
-    </p:tnLst>
-    <p:bldLst>
-      <p:bldP spid="17" grpId="0" animBg="1"/>
-    </p:bldLst>
-  </p:timing>
 </p:sld>
 </file>
 
@@ -24413,87 +23910,6 @@
               <a:rPr lang="en-US" dirty="0"/>
               <a:t>Question 2</a:t>
             </a:r>
-          </a:p>
-        </p:txBody>
-      </p:sp>
-      <p:sp>
-        <p:nvSpPr>
-          <p:cNvPr id="3" name="Content Placeholder 2"/>
-          <p:cNvSpPr>
-            <a:spLocks noGrp="1"/>
-          </p:cNvSpPr>
-          <p:nvPr>
-            <p:ph idx="1"/>
-          </p:nvPr>
-        </p:nvSpPr>
-        <p:spPr/>
-        <p:txBody>
-          <a:bodyPr>
-            <a:normAutofit fontScale="92500" lnSpcReduction="20000"/>
-          </a:bodyPr>
-          <a:lstStyle/>
-          <a:p>
-            <a:r>
-              <a:rPr lang="en-US" sz="3200" dirty="0"/>
-              <a:t>You are the sports director of a small college. </a:t>
-            </a:r>
-          </a:p>
-          <a:p>
-            <a:r>
-              <a:rPr lang="en-US" sz="3200" dirty="0"/>
-              <a:t>The dean has instructed you to grow the athletic program. You must choose a new varsity sport that uses spherical balls.</a:t>
-            </a:r>
-          </a:p>
-          <a:p>
-            <a:r>
-              <a:rPr lang="en-US" sz="3200" dirty="0"/>
-              <a:t>The sport must be able to sell tickets in the university’s outdoor grass turf venue to anyone.</a:t>
-            </a:r>
-          </a:p>
-          <a:p>
-            <a:r>
-              <a:rPr lang="en-US" sz="3200" dirty="0"/>
-              <a:t>Which sport program should you choose? </a:t>
-            </a:r>
-          </a:p>
-          <a:p>
-            <a:pPr marL="0" indent="0">
-              <a:buNone/>
-            </a:pPr>
-            <a:endParaRPr lang="en-US" dirty="0"/>
-          </a:p>
-          <a:p>
-            <a:pPr marL="0" indent="0">
-              <a:buNone/>
-            </a:pPr>
-            <a:endParaRPr lang="en-US" dirty="0"/>
-          </a:p>
-          <a:p>
-            <a:r>
-              <a:rPr lang="en-US" dirty="0"/>
-              <a:t>A. 	Basketball</a:t>
-            </a:r>
-          </a:p>
-          <a:p>
-            <a:r>
-              <a:rPr lang="en-US" dirty="0"/>
-              <a:t>B. 	Baseball</a:t>
-            </a:r>
-          </a:p>
-          <a:p>
-            <a:r>
-              <a:rPr lang="en-US" dirty="0"/>
-              <a:t>C. 	Football</a:t>
-            </a:r>
-          </a:p>
-          <a:p>
-            <a:r>
-              <a:rPr lang="en-US" dirty="0"/>
-              <a:t>D. 	Quidditch</a:t>
-            </a:r>
-          </a:p>
-          <a:p>
-            <a:endParaRPr lang="en-US" dirty="0"/>
           </a:p>
         </p:txBody>
       </p:sp>
@@ -24742,6 +24158,87 @@
           <a:p>
             <a:pPr algn="ctr"/>
             <a:endParaRPr lang="en-US"/>
+          </a:p>
+        </p:txBody>
+      </p:sp>
+      <p:sp>
+        <p:nvSpPr>
+          <p:cNvPr id="3" name="Content Placeholder 2"/>
+          <p:cNvSpPr>
+            <a:spLocks noGrp="1"/>
+          </p:cNvSpPr>
+          <p:nvPr>
+            <p:ph idx="1"/>
+          </p:nvPr>
+        </p:nvSpPr>
+        <p:spPr/>
+        <p:txBody>
+          <a:bodyPr>
+            <a:normAutofit fontScale="92500" lnSpcReduction="20000"/>
+          </a:bodyPr>
+          <a:lstStyle/>
+          <a:p>
+            <a:r>
+              <a:rPr lang="en-US" sz="3200" dirty="0"/>
+              <a:t>You are the sports director of a small college. </a:t>
+            </a:r>
+          </a:p>
+          <a:p>
+            <a:r>
+              <a:rPr lang="en-US" sz="3200" dirty="0"/>
+              <a:t>The dean has instructed you to grow the athletic program. You must choose a new varsity sport that uses spherical balls.</a:t>
+            </a:r>
+          </a:p>
+          <a:p>
+            <a:r>
+              <a:rPr lang="en-US" sz="3200" dirty="0"/>
+              <a:t>The sport must be able to sell tickets in the university’s outdoor grass turf venue to anyone.</a:t>
+            </a:r>
+          </a:p>
+          <a:p>
+            <a:r>
+              <a:rPr lang="en-US" sz="3200" dirty="0"/>
+              <a:t>You need to choose a new sport program.</a:t>
+            </a:r>
+          </a:p>
+          <a:p>
+            <a:pPr marL="0" indent="0">
+              <a:buNone/>
+            </a:pPr>
+            <a:endParaRPr lang="en-US" dirty="0"/>
+          </a:p>
+          <a:p>
+            <a:pPr marL="0" indent="0">
+              <a:buNone/>
+            </a:pPr>
+            <a:endParaRPr lang="en-US" dirty="0"/>
+          </a:p>
+          <a:p>
+            <a:r>
+              <a:rPr lang="en-US" dirty="0"/>
+              <a:t>A. 	Basketball</a:t>
+            </a:r>
+          </a:p>
+          <a:p>
+            <a:r>
+              <a:rPr lang="en-US" dirty="0"/>
+              <a:t>B. 	Baseball</a:t>
+            </a:r>
+          </a:p>
+          <a:p>
+            <a:r>
+              <a:rPr lang="en-US" dirty="0"/>
+              <a:t>C. 	Football</a:t>
+            </a:r>
+          </a:p>
+          <a:p>
+            <a:r>
+              <a:rPr lang="en-US" dirty="0"/>
+              <a:t>D. 	Quidditch</a:t>
+            </a:r>
+          </a:p>
+          <a:p>
+            <a:endParaRPr lang="en-US" dirty="0"/>
           </a:p>
         </p:txBody>
       </p:sp>
@@ -25232,13 +24729,13 @@
           <a:p>
             <a:r>
               <a:rPr lang="en-US" sz="3200" dirty="0"/>
-              <a:t>The film must be a science fiction film featuring both a cat and an android. You must not choose a film that features raccoons. </a:t>
+              <a:t>The film must be a science fiction film featuring both a cat and an android. You must not choose a film that features any raccoons. </a:t>
             </a:r>
           </a:p>
           <a:p>
             <a:r>
               <a:rPr lang="en-US" sz="3200" dirty="0"/>
-              <a:t>Which film should you choose?</a:t>
+              <a:t>You need to choose a film for the screening.</a:t>
             </a:r>
           </a:p>
           <a:p>
@@ -25259,7 +24756,7 @@
           <a:p>
             <a:r>
               <a:rPr lang="en-US" dirty="0"/>
-              <a:t>B. 	Alien</a:t>
+              <a:t>B. 	Blade Runner</a:t>
             </a:r>
           </a:p>
           <a:p>
@@ -25427,8 +24924,8 @@
         </p:nvCxnSpPr>
         <p:spPr>
           <a:xfrm flipH="1">
-            <a:off x="8593285" y="2692137"/>
-            <a:ext cx="1426613" cy="0"/>
+            <a:off x="8593286" y="2692137"/>
+            <a:ext cx="2094379" cy="0"/>
           </a:xfrm>
           <a:prstGeom prst="line">
             <a:avLst/>
@@ -25462,7 +24959,7 @@
         </p:nvSpPr>
         <p:spPr>
           <a:xfrm rot="10800000">
-            <a:off x="2449663" y="5439684"/>
+            <a:off x="2508656" y="5439684"/>
             <a:ext cx="1371600" cy="385483"/>
           </a:xfrm>
           <a:prstGeom prst="rightArrow">
@@ -26071,6 +25568,92 @@
       </p:grpSpPr>
       <p:sp>
         <p:nvSpPr>
+          <p:cNvPr id="3" name="Content Placeholder 2"/>
+          <p:cNvSpPr>
+            <a:spLocks noGrp="1"/>
+          </p:cNvSpPr>
+          <p:nvPr>
+            <p:ph idx="1"/>
+          </p:nvPr>
+        </p:nvSpPr>
+        <p:spPr>
+          <a:xfrm>
+            <a:off x="501448" y="931611"/>
+            <a:ext cx="10972800" cy="5459357"/>
+          </a:xfrm>
+        </p:spPr>
+        <p:txBody>
+          <a:bodyPr>
+            <a:normAutofit fontScale="77500" lnSpcReduction="20000"/>
+          </a:bodyPr>
+          <a:lstStyle/>
+          <a:p>
+            <a:r>
+              <a:rPr lang="en-US" sz="4100" dirty="0"/>
+              <a:t>You are the bartender of a local fine dining establishment.</a:t>
+            </a:r>
+          </a:p>
+          <a:p>
+            <a:r>
+              <a:rPr lang="en-US" sz="4100" dirty="0"/>
+              <a:t>You are instructed to serve an appropriate spirit to a diner. Your establishment only serves whiskeys aged in American oak barrels.</a:t>
+            </a:r>
+          </a:p>
+          <a:p>
+            <a:r>
+              <a:rPr lang="en-US" sz="4100" dirty="0"/>
+              <a:t>The diner has requested a malt whiskey from outside of Tennessee. The malt must not contain corn. </a:t>
+            </a:r>
+          </a:p>
+          <a:p>
+            <a:r>
+              <a:rPr lang="en-US" sz="4100" dirty="0"/>
+              <a:t>You need to choose a spirit.</a:t>
+            </a:r>
+          </a:p>
+          <a:p>
+            <a:pPr marL="0" indent="0">
+              <a:buNone/>
+            </a:pPr>
+            <a:endParaRPr lang="en-US" dirty="0"/>
+          </a:p>
+          <a:p>
+            <a:pPr marL="0" indent="0">
+              <a:buNone/>
+            </a:pPr>
+            <a:endParaRPr lang="en-US" dirty="0"/>
+          </a:p>
+          <a:p>
+            <a:r>
+              <a:rPr lang="en-US" sz="3300" dirty="0"/>
+              <a:t>A. 	Scotch</a:t>
+            </a:r>
+          </a:p>
+          <a:p>
+            <a:r>
+              <a:rPr lang="en-US" sz="3300" dirty="0"/>
+              <a:t>B. 	Bourbon</a:t>
+            </a:r>
+          </a:p>
+          <a:p>
+            <a:r>
+              <a:rPr lang="en-US" sz="3300" dirty="0"/>
+              <a:t>C. 	Tennessee Whiskey</a:t>
+            </a:r>
+          </a:p>
+          <a:p>
+            <a:r>
+              <a:rPr lang="en-US" sz="3300" dirty="0"/>
+              <a:t>D. 	Cognac</a:t>
+            </a:r>
+          </a:p>
+          <a:p>
+            <a:endParaRPr lang="en-US" dirty="0"/>
+          </a:p>
+        </p:txBody>
+      </p:sp>
+      <p:sp>
+        <p:nvSpPr>
           <p:cNvPr id="2" name="Title 1"/>
           <p:cNvSpPr>
             <a:spLocks noGrp="1"/>
@@ -26088,95 +25671,6 @@
               <a:rPr lang="en-US" dirty="0"/>
               <a:t>Question 4</a:t>
             </a:r>
-          </a:p>
-        </p:txBody>
-      </p:sp>
-      <p:sp>
-        <p:nvSpPr>
-          <p:cNvPr id="3" name="Content Placeholder 2"/>
-          <p:cNvSpPr>
-            <a:spLocks noGrp="1"/>
-          </p:cNvSpPr>
-          <p:nvPr>
-            <p:ph idx="1"/>
-          </p:nvPr>
-        </p:nvSpPr>
-        <p:spPr/>
-        <p:txBody>
-          <a:bodyPr>
-            <a:normAutofit fontScale="85000" lnSpcReduction="20000"/>
-          </a:bodyPr>
-          <a:lstStyle/>
-          <a:p>
-            <a:r>
-              <a:rPr lang="en-US" sz="3200" dirty="0"/>
-              <a:t>You are the bartender of a local fine dining establishment.</a:t>
-            </a:r>
-          </a:p>
-          <a:p>
-            <a:r>
-              <a:rPr lang="en-US" sz="3200" dirty="0"/>
-              <a:t>You are instructed to provide the appropriate whiskey to a diner. Your establishment only serves whiskeys aged in American oak barrels.</a:t>
-            </a:r>
-          </a:p>
-          <a:p>
-            <a:r>
-              <a:rPr lang="en-US" sz="3200" dirty="0"/>
-              <a:t>The diner has requested a malt whiskey from outside of Tennessee. The malt must not contain corn. </a:t>
-            </a:r>
-          </a:p>
-          <a:p>
-            <a:r>
-              <a:rPr lang="en-US" sz="3200" dirty="0"/>
-              <a:t>Which whiskey do you choose?</a:t>
-            </a:r>
-          </a:p>
-          <a:p>
-            <a:pPr marL="0" indent="0">
-              <a:buNone/>
-            </a:pPr>
-            <a:endParaRPr lang="en-US" dirty="0"/>
-          </a:p>
-          <a:p>
-            <a:pPr marL="0" indent="0">
-              <a:buNone/>
-            </a:pPr>
-            <a:endParaRPr lang="en-US" dirty="0"/>
-          </a:p>
-          <a:p>
-            <a:r>
-              <a:rPr lang="en-US" dirty="0"/>
-              <a:t>A. 	Scotch Whisky</a:t>
-            </a:r>
-          </a:p>
-          <a:p>
-            <a:r>
-              <a:rPr lang="en-US" dirty="0"/>
-              <a:t>B. 	Bourbon</a:t>
-            </a:r>
-          </a:p>
-          <a:p>
-            <a:r>
-              <a:rPr lang="en-US" dirty="0"/>
-              <a:t>C. 	</a:t>
-            </a:r>
-            <a:r>
-              <a:rPr lang="en-US" dirty="0" err="1"/>
-              <a:t>Tenneessee</a:t>
-            </a:r>
-            <a:r>
-              <a:rPr lang="en-US" dirty="0"/>
-              <a:t> Whiskey</a:t>
-            </a:r>
-          </a:p>
-          <a:p>
-            <a:r>
-              <a:rPr lang="en-US" dirty="0"/>
-              <a:t>D. 	Cognac</a:t>
-            </a:r>
-          </a:p>
-          <a:p>
-            <a:endParaRPr lang="en-US" dirty="0"/>
           </a:p>
         </p:txBody>
       </p:sp>
@@ -26188,7 +25682,7 @@
         </p:nvCxnSpPr>
         <p:spPr>
           <a:xfrm flipH="1" flipV="1">
-            <a:off x="1578304" y="4898943"/>
+            <a:off x="1519312" y="5562793"/>
             <a:ext cx="3988778" cy="25380"/>
           </a:xfrm>
           <a:prstGeom prst="line">
@@ -26219,7 +25713,7 @@
         </p:nvCxnSpPr>
         <p:spPr>
           <a:xfrm flipH="1">
-            <a:off x="1528998" y="5311267"/>
+            <a:off x="1470006" y="5989695"/>
             <a:ext cx="4087390" cy="0"/>
           </a:xfrm>
           <a:prstGeom prst="line">
@@ -26254,7 +25748,7 @@
         </p:nvCxnSpPr>
         <p:spPr>
           <a:xfrm flipH="1" flipV="1">
-            <a:off x="1578304" y="4525078"/>
+            <a:off x="1568618" y="5120251"/>
             <a:ext cx="3988778" cy="38478"/>
           </a:xfrm>
           <a:prstGeom prst="line">
@@ -26291,7 +25785,7 @@
         </p:nvCxnSpPr>
         <p:spPr>
           <a:xfrm flipH="1">
-            <a:off x="8346143" y="2457059"/>
+            <a:off x="905996" y="3246383"/>
             <a:ext cx="1845607" cy="0"/>
           </a:xfrm>
           <a:prstGeom prst="line">
@@ -26323,9 +25817,9 @@
           <p:nvPr/>
         </p:nvCxnSpPr>
         <p:spPr>
-          <a:xfrm flipH="1">
-            <a:off x="2323928" y="2725271"/>
-            <a:ext cx="2438572" cy="0"/>
+          <a:xfrm flipH="1" flipV="1">
+            <a:off x="5303104" y="3238289"/>
+            <a:ext cx="2621696" cy="8094"/>
           </a:xfrm>
           <a:prstGeom prst="line">
             <a:avLst/>
@@ -26361,8 +25855,8 @@
         </p:nvCxnSpPr>
         <p:spPr>
           <a:xfrm flipH="1">
-            <a:off x="4612342" y="2444281"/>
-            <a:ext cx="1807508" cy="0"/>
+            <a:off x="5192246" y="2896569"/>
+            <a:ext cx="2063960" cy="0"/>
           </a:xfrm>
           <a:prstGeom prst="line">
             <a:avLst/>
@@ -26396,7 +25890,7 @@
         </p:nvSpPr>
         <p:spPr>
           <a:xfrm rot="10800000">
-            <a:off x="4372361" y="3867287"/>
+            <a:off x="2592725" y="4473589"/>
             <a:ext cx="1371600" cy="385483"/>
           </a:xfrm>
           <a:prstGeom prst="rightArrow">
@@ -26808,6 +26302,82 @@
       </p:grpSpPr>
       <p:sp>
         <p:nvSpPr>
+          <p:cNvPr id="3" name="Content Placeholder 2"/>
+          <p:cNvSpPr>
+            <a:spLocks noGrp="1"/>
+          </p:cNvSpPr>
+          <p:nvPr>
+            <p:ph idx="1"/>
+          </p:nvPr>
+        </p:nvSpPr>
+        <p:spPr/>
+        <p:txBody>
+          <a:bodyPr>
+            <a:normAutofit fontScale="92500" lnSpcReduction="20000"/>
+          </a:bodyPr>
+          <a:lstStyle/>
+          <a:p>
+            <a:r>
+              <a:rPr lang="en-US" sz="3200" dirty="0"/>
+              <a:t>You are the social media director for a cool hip company.</a:t>
+            </a:r>
+          </a:p>
+          <a:p>
+            <a:r>
+              <a:rPr lang="en-US" sz="3200" dirty="0"/>
+              <a:t>Your new marketing campaign much choose a social media platform. </a:t>
+            </a:r>
+          </a:p>
+          <a:p>
+            <a:r>
+              <a:rPr lang="en-US" sz="3200" dirty="0"/>
+              <a:t>The social media platform must be persistent online forever. The grandmother of the CEO must not be aware of the platform. The platform be a social media platform with accelerating growth.</a:t>
+            </a:r>
+          </a:p>
+          <a:p>
+            <a:r>
+              <a:rPr lang="en-US" sz="3200" dirty="0"/>
+              <a:t>You need to choose a social media platform.</a:t>
+            </a:r>
+            <a:endParaRPr lang="en-US" dirty="0"/>
+          </a:p>
+          <a:p>
+            <a:pPr marL="0" indent="0">
+              <a:buNone/>
+            </a:pPr>
+            <a:endParaRPr lang="en-US" dirty="0"/>
+          </a:p>
+          <a:p>
+            <a:r>
+              <a:rPr lang="en-US" dirty="0"/>
+              <a:t>A. 	Facebook</a:t>
+            </a:r>
+          </a:p>
+          <a:p>
+            <a:r>
+              <a:rPr lang="en-US" dirty="0"/>
+              <a:t>B. 	Twitter</a:t>
+            </a:r>
+          </a:p>
+          <a:p>
+            <a:r>
+              <a:rPr lang="en-US" dirty="0"/>
+              <a:t>C. 	Instagram</a:t>
+            </a:r>
+          </a:p>
+          <a:p>
+            <a:r>
+              <a:rPr lang="en-US" dirty="0"/>
+              <a:t>D. 	Snapchat</a:t>
+            </a:r>
+          </a:p>
+          <a:p>
+            <a:endParaRPr lang="en-US" dirty="0"/>
+          </a:p>
+        </p:txBody>
+      </p:sp>
+      <p:sp>
+        <p:nvSpPr>
           <p:cNvPr id="2" name="Title 1"/>
           <p:cNvSpPr>
             <a:spLocks noGrp="1"/>
@@ -26825,87 +26395,6 @@
               <a:rPr lang="en-US" dirty="0"/>
               <a:t>Question 5</a:t>
             </a:r>
-          </a:p>
-        </p:txBody>
-      </p:sp>
-      <p:sp>
-        <p:nvSpPr>
-          <p:cNvPr id="3" name="Content Placeholder 2"/>
-          <p:cNvSpPr>
-            <a:spLocks noGrp="1"/>
-          </p:cNvSpPr>
-          <p:nvPr>
-            <p:ph idx="1"/>
-          </p:nvPr>
-        </p:nvSpPr>
-        <p:spPr/>
-        <p:txBody>
-          <a:bodyPr>
-            <a:normAutofit fontScale="92500" lnSpcReduction="20000"/>
-          </a:bodyPr>
-          <a:lstStyle/>
-          <a:p>
-            <a:r>
-              <a:rPr lang="en-US" sz="3200" dirty="0"/>
-              <a:t>You are the social media director for a cool hip company.</a:t>
-            </a:r>
-          </a:p>
-          <a:p>
-            <a:r>
-              <a:rPr lang="en-US" sz="3200" dirty="0"/>
-              <a:t>Your new marketing campaign much choose a social media platform. </a:t>
-            </a:r>
-          </a:p>
-          <a:p>
-            <a:r>
-              <a:rPr lang="en-US" sz="3200" dirty="0"/>
-              <a:t>The social media platform must be persistent online forever. The grandmother of the CEO must not be aware of the platform.</a:t>
-            </a:r>
-          </a:p>
-          <a:p>
-            <a:r>
-              <a:rPr lang="en-US" sz="3200" dirty="0"/>
-              <a:t>The platform be a social media platform with accelerating growth.</a:t>
-            </a:r>
-          </a:p>
-          <a:p>
-            <a:pPr marL="0" indent="0">
-              <a:buNone/>
-            </a:pPr>
-            <a:endParaRPr lang="en-US" dirty="0"/>
-          </a:p>
-          <a:p>
-            <a:pPr marL="0" indent="0">
-              <a:buNone/>
-            </a:pPr>
-            <a:endParaRPr lang="en-US" dirty="0"/>
-          </a:p>
-          <a:p>
-            <a:r>
-              <a:rPr lang="en-US" dirty="0"/>
-              <a:t>A. 	Facebook</a:t>
-            </a:r>
-          </a:p>
-          <a:p>
-            <a:r>
-              <a:rPr lang="en-US" dirty="0"/>
-              <a:t>B. 	Twitter</a:t>
-            </a:r>
-          </a:p>
-          <a:p>
-            <a:r>
-              <a:rPr lang="en-US" dirty="0"/>
-              <a:t>C. 	Instagram</a:t>
-            </a:r>
-          </a:p>
-          <a:p>
-            <a:r>
-              <a:rPr lang="en-US" dirty="0"/>
-              <a:t>D. 	Snapchat</a:t>
-            </a:r>
-          </a:p>
-          <a:p>
-            <a:endParaRPr lang="en-US" dirty="0"/>
           </a:p>
         </p:txBody>
       </p:sp>
@@ -26917,7 +26406,7 @@
         </p:nvCxnSpPr>
         <p:spPr>
           <a:xfrm flipH="1" flipV="1">
-            <a:off x="1578304" y="4377430"/>
+            <a:off x="1578304" y="4296744"/>
             <a:ext cx="3988778" cy="25380"/>
           </a:xfrm>
           <a:prstGeom prst="line">
@@ -26948,7 +26437,7 @@
         </p:nvCxnSpPr>
         <p:spPr>
           <a:xfrm flipH="1">
-            <a:off x="1528998" y="5624339"/>
+            <a:off x="1528998" y="5555513"/>
             <a:ext cx="4087390" cy="0"/>
           </a:xfrm>
           <a:prstGeom prst="line">
@@ -26983,7 +26472,7 @@
         </p:nvCxnSpPr>
         <p:spPr>
           <a:xfrm flipH="1" flipV="1">
-            <a:off x="1578304" y="4781859"/>
+            <a:off x="1578304" y="4706193"/>
             <a:ext cx="3988778" cy="38478"/>
           </a:xfrm>
           <a:prstGeom prst="line">
@@ -27013,13 +26502,15 @@
       <p:cxnSp>
         <p:nvCxnSpPr>
           <p:cNvPr id="13" name="Straight Connector 12"/>
-          <p:cNvCxnSpPr/>
+          <p:cNvCxnSpPr>
+            <a:cxnSpLocks/>
+          </p:cNvCxnSpPr>
           <p:nvPr/>
         </p:nvCxnSpPr>
         <p:spPr>
-          <a:xfrm flipH="1" flipV="1">
-            <a:off x="867747" y="2876884"/>
-            <a:ext cx="3909528" cy="3945"/>
+          <a:xfrm flipH="1">
+            <a:off x="1084057" y="2817806"/>
+            <a:ext cx="3476622" cy="1"/>
           </a:xfrm>
           <a:prstGeom prst="line">
             <a:avLst/>
@@ -27049,7 +26540,7 @@
         </p:nvCxnSpPr>
         <p:spPr>
           <a:xfrm flipH="1">
-            <a:off x="8034261" y="3350422"/>
+            <a:off x="7393469" y="3173444"/>
             <a:ext cx="2969731" cy="0"/>
           </a:xfrm>
           <a:prstGeom prst="line">
@@ -27084,7 +26575,7 @@
         </p:nvCxnSpPr>
         <p:spPr>
           <a:xfrm flipH="1">
-            <a:off x="6379013" y="2547257"/>
+            <a:off x="6452131" y="2503779"/>
             <a:ext cx="3698048" cy="7613"/>
           </a:xfrm>
           <a:prstGeom prst="line">
@@ -27119,7 +26610,7 @@
         </p:nvSpPr>
         <p:spPr>
           <a:xfrm rot="10800000">
-            <a:off x="2972769" y="4987735"/>
+            <a:off x="2962937" y="4935998"/>
             <a:ext cx="1371600" cy="385483"/>
           </a:xfrm>
           <a:prstGeom prst="rightArrow">
@@ -27588,7 +27079,7 @@
           <a:p>
             <a:r>
               <a:rPr lang="en-US" sz="3200" dirty="0"/>
-              <a:t>Which planet do you choose to settle on?</a:t>
+              <a:t>You need to choose a location for your new space base.</a:t>
             </a:r>
           </a:p>
           <a:p>
@@ -27642,7 +27133,7 @@
         </p:nvCxnSpPr>
         <p:spPr>
           <a:xfrm flipH="1">
-            <a:off x="1578304" y="4165374"/>
+            <a:off x="1578304" y="4047387"/>
             <a:ext cx="1095046" cy="0"/>
           </a:xfrm>
           <a:prstGeom prst="line">
@@ -27675,7 +27166,7 @@
         </p:nvCxnSpPr>
         <p:spPr>
           <a:xfrm flipH="1">
-            <a:off x="1578304" y="5059189"/>
+            <a:off x="1578304" y="4931370"/>
             <a:ext cx="1145846" cy="0"/>
           </a:xfrm>
           <a:prstGeom prst="line">
@@ -27712,7 +27203,7 @@
         </p:nvCxnSpPr>
         <p:spPr>
           <a:xfrm flipH="1">
-            <a:off x="1578304" y="4616759"/>
+            <a:off x="1578304" y="4479108"/>
             <a:ext cx="1145846" cy="0"/>
           </a:xfrm>
           <a:prstGeom prst="line">
@@ -27782,8 +27273,8 @@
         </p:nvCxnSpPr>
         <p:spPr>
           <a:xfrm flipH="1">
-            <a:off x="6426843" y="2368645"/>
-            <a:ext cx="1581376" cy="0"/>
+            <a:off x="6358017" y="2339148"/>
+            <a:ext cx="1763428" cy="0"/>
           </a:xfrm>
           <a:prstGeom prst="line">
             <a:avLst/>
@@ -28359,7 +27850,7 @@
               <a:buChar char="•"/>
             </a:pPr>
             <a:r>
-              <a:rPr lang="en-US" sz="1800" b="0" dirty="0">
+              <a:rPr lang="en-US" sz="2000" b="0" dirty="0">
                 <a:solidFill>
                   <a:schemeClr val="tx1"/>
                 </a:solidFill>
@@ -28375,7 +27866,7 @@
               <a:buChar char="•"/>
             </a:pPr>
             <a:r>
-              <a:rPr lang="en-US" sz="1800" b="0" dirty="0">
+              <a:rPr lang="en-US" sz="2000" b="0" dirty="0">
                 <a:solidFill>
                   <a:schemeClr val="tx1"/>
                 </a:solidFill>
@@ -28391,7 +27882,7 @@
               <a:buChar char="•"/>
             </a:pPr>
             <a:r>
-              <a:rPr lang="en-US" sz="1800" b="0" dirty="0">
+              <a:rPr lang="en-US" sz="2000" b="0" dirty="0">
                 <a:solidFill>
                   <a:schemeClr val="tx1"/>
                 </a:solidFill>
@@ -28400,7 +27891,7 @@
               </a:rPr>
               <a:t>https://borntolearn.mslearn.net/b/weblog/archive/2014/03/10/certification-update-sql-server-2014</a:t>
             </a:r>
-            <a:endParaRPr lang="en-US" sz="1800" b="0" dirty="0">
+            <a:endParaRPr lang="en-US" sz="2000" b="0" dirty="0">
               <a:solidFill>
                 <a:schemeClr val="tx1"/>
               </a:solidFill>
@@ -28412,7 +27903,7 @@
               <a:buFont typeface="Arial" panose="020B0604020202020204" pitchFamily="34" charset="0"/>
               <a:buChar char="•"/>
             </a:pPr>
-            <a:endParaRPr lang="en-US" sz="1800" b="0" dirty="0">
+            <a:endParaRPr lang="en-US" sz="2000" b="0" dirty="0">
               <a:solidFill>
                 <a:schemeClr val="tx1"/>
               </a:solidFill>
@@ -28426,7 +27917,7 @@
               <a:buChar char="•"/>
             </a:pPr>
             <a:r>
-              <a:rPr lang="en-US" sz="1800" b="0" dirty="0">
+              <a:rPr lang="en-US" sz="2000" b="0" dirty="0">
                 <a:solidFill>
                   <a:schemeClr val="tx1"/>
                 </a:solidFill>
@@ -28442,7 +27933,7 @@
               <a:buChar char="•"/>
             </a:pPr>
             <a:r>
-              <a:rPr lang="en-US" sz="1800" b="0" dirty="0">
+              <a:rPr lang="en-US" sz="2000" b="0" dirty="0">
                 <a:solidFill>
                   <a:schemeClr val="tx1"/>
                 </a:solidFill>
@@ -28451,7 +27942,7 @@
               </a:rPr>
               <a:t>https://www.microsoft.com/learning/en-us/exam-70-463.aspx</a:t>
             </a:r>
-            <a:endParaRPr lang="en-US" sz="1800" b="0" dirty="0">
+            <a:endParaRPr lang="en-US" sz="2000" b="0" dirty="0">
               <a:solidFill>
                 <a:schemeClr val="tx1"/>
               </a:solidFill>
@@ -28464,7 +27955,7 @@
               <a:buChar char="•"/>
             </a:pPr>
             <a:r>
-              <a:rPr lang="en-US" sz="1800" b="0" dirty="0">
+              <a:rPr lang="en-US" sz="2000" b="0" dirty="0">
                 <a:solidFill>
                   <a:schemeClr val="tx1"/>
                 </a:solidFill>
@@ -28473,7 +27964,7 @@
               </a:rPr>
               <a:t>https://www.microsoft.com/en-ca/learning/sql-certification.aspx</a:t>
             </a:r>
-            <a:endParaRPr lang="en-US" sz="1800" b="0" dirty="0">
+            <a:endParaRPr lang="en-US" sz="2000" b="0" dirty="0">
               <a:solidFill>
                 <a:schemeClr val="tx1"/>
               </a:solidFill>
@@ -28485,7 +27976,7 @@
               <a:buFont typeface="Arial" panose="020B0604020202020204" pitchFamily="34" charset="0"/>
               <a:buChar char="•"/>
             </a:pPr>
-            <a:endParaRPr lang="en-US" sz="1800" b="0" dirty="0">
+            <a:endParaRPr lang="en-US" sz="2000" b="0" dirty="0">
               <a:solidFill>
                 <a:schemeClr val="tx1"/>
               </a:solidFill>
@@ -28497,7 +27988,7 @@
               <a:buFont typeface="Arial" panose="020B0604020202020204" pitchFamily="34" charset="0"/>
               <a:buChar char="•"/>
             </a:pPr>
-            <a:endParaRPr lang="en-US" sz="1800" b="0" dirty="0">
+            <a:endParaRPr lang="en-US" sz="2000" b="0" dirty="0">
               <a:solidFill>
                 <a:schemeClr val="tx1"/>
               </a:solidFill>
@@ -28509,7 +28000,7 @@
               <a:buFont typeface="Arial" panose="020B0604020202020204" pitchFamily="34" charset="0"/>
               <a:buChar char="•"/>
             </a:pPr>
-            <a:endParaRPr lang="en-US" sz="1800" b="0" dirty="0">
+            <a:endParaRPr lang="en-US" sz="2000" b="0" dirty="0">
               <a:solidFill>
                 <a:schemeClr val="tx1"/>
               </a:solidFill>
@@ -28521,7 +28012,7 @@
               <a:buFont typeface="Arial" panose="020B0604020202020204" pitchFamily="34" charset="0"/>
               <a:buChar char="•"/>
             </a:pPr>
-            <a:endParaRPr lang="en-US" sz="1800" b="0" dirty="0">
+            <a:endParaRPr lang="en-US" sz="2000" b="0" dirty="0">
               <a:solidFill>
                 <a:schemeClr val="tx1"/>
               </a:solidFill>
@@ -28533,7 +28024,7 @@
               <a:buFont typeface="Arial" panose="020B0604020202020204" pitchFamily="34" charset="0"/>
               <a:buChar char="•"/>
             </a:pPr>
-            <a:endParaRPr lang="en-US" sz="1800" b="0" dirty="0">
+            <a:endParaRPr lang="en-US" sz="2000" b="0" dirty="0">
               <a:solidFill>
                 <a:schemeClr val="tx1"/>
               </a:solidFill>
@@ -30660,6 +30151,9 @@
                     <p:cTn id="3" fill="hold">
                       <p:stCondLst>
                         <p:cond delay="indefinite"/>
+                        <p:cond evt="onBegin" delay="0">
+                          <p:tn val="2"/>
+                        </p:cond>
                       </p:stCondLst>
                       <p:childTnLst>
                         <p:par>
@@ -30669,7 +30163,7 @@
                             </p:stCondLst>
                             <p:childTnLst>
                               <p:par>
-                                <p:cTn id="5" presetID="1" presetClass="entr" presetSubtype="0" fill="hold" grpId="0" nodeType="clickEffect">
+                                <p:cTn id="5" presetID="1" presetClass="entr" presetSubtype="0" fill="hold" grpId="0" nodeType="withEffect">
                                   <p:stCondLst>
                                     <p:cond delay="0"/>
                                   </p:stCondLst>
@@ -30699,33 +30193,15 @@
                                   </p:childTnLst>
                                 </p:cTn>
                               </p:par>
-                            </p:childTnLst>
-                          </p:cTn>
-                        </p:par>
-                      </p:childTnLst>
-                    </p:cTn>
-                  </p:par>
-                  <p:par>
-                    <p:cTn id="7" fill="hold">
-                      <p:stCondLst>
-                        <p:cond delay="indefinite"/>
-                      </p:stCondLst>
-                      <p:childTnLst>
-                        <p:par>
-                          <p:cTn id="8" fill="hold">
-                            <p:stCondLst>
-                              <p:cond delay="0"/>
-                            </p:stCondLst>
-                            <p:childTnLst>
                               <p:par>
-                                <p:cTn id="9" presetID="1" presetClass="entr" presetSubtype="0" fill="hold" grpId="0" nodeType="clickEffect">
+                                <p:cTn id="7" presetID="1" presetClass="entr" presetSubtype="0" fill="hold" grpId="0" nodeType="withEffect">
                                   <p:stCondLst>
                                     <p:cond delay="0"/>
                                   </p:stCondLst>
                                   <p:childTnLst>
                                     <p:set>
                                       <p:cBhvr>
-                                        <p:cTn id="10" dur="1" fill="hold">
+                                        <p:cTn id="8" dur="1" fill="hold">
                                           <p:stCondLst>
                                             <p:cond delay="0"/>
                                           </p:stCondLst>
@@ -30748,33 +30224,15 @@
                                   </p:childTnLst>
                                 </p:cTn>
                               </p:par>
-                            </p:childTnLst>
-                          </p:cTn>
-                        </p:par>
-                      </p:childTnLst>
-                    </p:cTn>
-                  </p:par>
-                  <p:par>
-                    <p:cTn id="11" fill="hold">
-                      <p:stCondLst>
-                        <p:cond delay="indefinite"/>
-                      </p:stCondLst>
-                      <p:childTnLst>
-                        <p:par>
-                          <p:cTn id="12" fill="hold">
-                            <p:stCondLst>
-                              <p:cond delay="0"/>
-                            </p:stCondLst>
-                            <p:childTnLst>
                               <p:par>
-                                <p:cTn id="13" presetID="1" presetClass="entr" presetSubtype="0" fill="hold" grpId="0" nodeType="clickEffect">
+                                <p:cTn id="9" presetID="1" presetClass="entr" presetSubtype="0" fill="hold" grpId="0" nodeType="withEffect">
                                   <p:stCondLst>
                                     <p:cond delay="0"/>
                                   </p:stCondLst>
                                   <p:childTnLst>
                                     <p:set>
                                       <p:cBhvr>
-                                        <p:cTn id="14" dur="1" fill="hold">
+                                        <p:cTn id="10" dur="1" fill="hold">
                                           <p:stCondLst>
                                             <p:cond delay="0"/>
                                           </p:stCondLst>

</xml_diff>